<commit_message>
Update diagram for Storage
</commit_message>
<xml_diff>
--- a/docs/diagrams/StorageComponentClassDiagram.pptx
+++ b/docs/diagrams/StorageComponentClassDiagram.pptx
@@ -107,6 +107,22 @@
       </a:defRPr>
     </a:lvl9pPr>
   </p:defaultTextStyle>
+  <p:extLst>
+    <p:ext uri="{EFAFB233-063F-42B5-8137-9DF3F51BA10A}">
+      <p15:sldGuideLst xmlns:p15="http://schemas.microsoft.com/office/powerpoint/2012/main">
+        <p15:guide id="1" orient="horz" pos="1488">
+          <p15:clr>
+            <a:srgbClr val="A4A3A4"/>
+          </p15:clr>
+        </p15:guide>
+        <p15:guide id="2" pos="2880">
+          <p15:clr>
+            <a:srgbClr val="A4A3A4"/>
+          </p15:clr>
+        </p15:guide>
+      </p15:sldGuideLst>
+    </p:ext>
+  </p:extLst>
 </p:presentation>
 </file>
 
@@ -192,7 +208,7 @@
           <a:p>
             <a:fld id="{F5CC4B3F-88C1-4FFA-B1B6-F41C21DC6924}" type="datetimeFigureOut">
               <a:rPr lang="en-US" smtClean="0"/>
-              <a:t>10/16/2016</a:t>
+              <a:t>11/13/17</a:t>
             </a:fld>
             <a:endParaRPr lang="en-US"/>
           </a:p>
@@ -641,7 +657,7 @@
           <a:p>
             <a:fld id="{78C97017-6FC3-485B-9764-EAC9E56C1D49}" type="datetimeFigureOut">
               <a:rPr lang="en-US" smtClean="0"/>
-              <a:t>10/16/2016</a:t>
+              <a:t>11/13/17</a:t>
             </a:fld>
             <a:endParaRPr lang="en-US"/>
           </a:p>
@@ -811,7 +827,7 @@
           <a:p>
             <a:fld id="{78C97017-6FC3-485B-9764-EAC9E56C1D49}" type="datetimeFigureOut">
               <a:rPr lang="en-US" smtClean="0"/>
-              <a:t>10/16/2016</a:t>
+              <a:t>11/13/17</a:t>
             </a:fld>
             <a:endParaRPr lang="en-US"/>
           </a:p>
@@ -991,7 +1007,7 @@
           <a:p>
             <a:fld id="{78C97017-6FC3-485B-9764-EAC9E56C1D49}" type="datetimeFigureOut">
               <a:rPr lang="en-US" smtClean="0"/>
-              <a:t>10/16/2016</a:t>
+              <a:t>11/13/17</a:t>
             </a:fld>
             <a:endParaRPr lang="en-US"/>
           </a:p>
@@ -1161,7 +1177,7 @@
           <a:p>
             <a:fld id="{78C97017-6FC3-485B-9764-EAC9E56C1D49}" type="datetimeFigureOut">
               <a:rPr lang="en-US" smtClean="0"/>
-              <a:t>10/16/2016</a:t>
+              <a:t>11/13/17</a:t>
             </a:fld>
             <a:endParaRPr lang="en-US"/>
           </a:p>
@@ -1407,7 +1423,7 @@
           <a:p>
             <a:fld id="{78C97017-6FC3-485B-9764-EAC9E56C1D49}" type="datetimeFigureOut">
               <a:rPr lang="en-US" smtClean="0"/>
-              <a:t>10/16/2016</a:t>
+              <a:t>11/13/17</a:t>
             </a:fld>
             <a:endParaRPr lang="en-US"/>
           </a:p>
@@ -1695,7 +1711,7 @@
           <a:p>
             <a:fld id="{78C97017-6FC3-485B-9764-EAC9E56C1D49}" type="datetimeFigureOut">
               <a:rPr lang="en-US" smtClean="0"/>
-              <a:t>10/16/2016</a:t>
+              <a:t>11/13/17</a:t>
             </a:fld>
             <a:endParaRPr lang="en-US"/>
           </a:p>
@@ -2117,7 +2133,7 @@
           <a:p>
             <a:fld id="{78C97017-6FC3-485B-9764-EAC9E56C1D49}" type="datetimeFigureOut">
               <a:rPr lang="en-US" smtClean="0"/>
-              <a:t>10/16/2016</a:t>
+              <a:t>11/13/17</a:t>
             </a:fld>
             <a:endParaRPr lang="en-US"/>
           </a:p>
@@ -2235,7 +2251,7 @@
           <a:p>
             <a:fld id="{78C97017-6FC3-485B-9764-EAC9E56C1D49}" type="datetimeFigureOut">
               <a:rPr lang="en-US" smtClean="0"/>
-              <a:t>10/16/2016</a:t>
+              <a:t>11/13/17</a:t>
             </a:fld>
             <a:endParaRPr lang="en-US"/>
           </a:p>
@@ -2330,7 +2346,7 @@
           <a:p>
             <a:fld id="{78C97017-6FC3-485B-9764-EAC9E56C1D49}" type="datetimeFigureOut">
               <a:rPr lang="en-US" smtClean="0"/>
-              <a:t>10/16/2016</a:t>
+              <a:t>11/13/17</a:t>
             </a:fld>
             <a:endParaRPr lang="en-US"/>
           </a:p>
@@ -2607,7 +2623,7 @@
           <a:p>
             <a:fld id="{78C97017-6FC3-485B-9764-EAC9E56C1D49}" type="datetimeFigureOut">
               <a:rPr lang="en-US" smtClean="0"/>
-              <a:t>10/16/2016</a:t>
+              <a:t>11/13/17</a:t>
             </a:fld>
             <a:endParaRPr lang="en-US"/>
           </a:p>
@@ -2860,7 +2876,7 @@
           <a:p>
             <a:fld id="{78C97017-6FC3-485B-9764-EAC9E56C1D49}" type="datetimeFigureOut">
               <a:rPr lang="en-US" smtClean="0"/>
-              <a:t>10/16/2016</a:t>
+              <a:t>11/13/17</a:t>
             </a:fld>
             <a:endParaRPr lang="en-US"/>
           </a:p>
@@ -3073,7 +3089,7 @@
           <a:p>
             <a:fld id="{78C97017-6FC3-485B-9764-EAC9E56C1D49}" type="datetimeFigureOut">
               <a:rPr lang="en-US" smtClean="0"/>
-              <a:t>10/16/2016</a:t>
+              <a:t>11/13/17</a:t>
             </a:fld>
             <a:endParaRPr lang="en-US"/>
           </a:p>
@@ -3456,8 +3472,8 @@
         </p:nvSpPr>
         <p:spPr>
           <a:xfrm>
-            <a:off x="1119865" y="2086382"/>
-            <a:ext cx="7871735" cy="1723618"/>
+            <a:off x="1119865" y="1524000"/>
+            <a:ext cx="7871735" cy="2286000"/>
           </a:xfrm>
           <a:prstGeom prst="roundRect">
             <a:avLst>
@@ -3599,8 +3615,8 @@
         </p:nvSpPr>
         <p:spPr>
           <a:xfrm rot="16200000">
-            <a:off x="1683963" y="2868687"/>
-            <a:ext cx="1093635" cy="346760"/>
+            <a:off x="1388837" y="2573561"/>
+            <a:ext cx="1683887" cy="346760"/>
           </a:xfrm>
           <a:prstGeom prst="rect">
             <a:avLst/>
@@ -3662,8 +3678,8 @@
         </p:nvSpPr>
         <p:spPr>
           <a:xfrm rot="16200000">
-            <a:off x="956202" y="2861202"/>
-            <a:ext cx="1093635" cy="346760"/>
+            <a:off x="664819" y="2569819"/>
+            <a:ext cx="1676401" cy="346760"/>
           </a:xfrm>
           <a:prstGeom prst="rect">
             <a:avLst/>
@@ -3736,7 +3752,7 @@
         </p:nvSpPr>
         <p:spPr>
           <a:xfrm rot="16200000">
-            <a:off x="1626910" y="2952291"/>
+            <a:off x="1637761" y="2643659"/>
             <a:ext cx="270504" cy="175523"/>
           </a:xfrm>
           <a:prstGeom prst="triangle">
@@ -3879,7 +3895,7 @@
         </p:nvCxnSpPr>
         <p:spPr>
           <a:xfrm flipV="1">
-            <a:off x="1849924" y="3040052"/>
+            <a:off x="1860775" y="2731420"/>
             <a:ext cx="216105" cy="1"/>
           </a:xfrm>
           <a:prstGeom prst="line">
@@ -4833,6 +4849,374 @@
           </a:fontRef>
         </p:style>
       </p:cxnSp>
+      <p:grpSp>
+        <p:nvGrpSpPr>
+          <p:cNvPr id="3" name="Group 2"/>
+          <p:cNvGrpSpPr/>
+          <p:nvPr/>
+        </p:nvGrpSpPr>
+        <p:grpSpPr>
+          <a:xfrm>
+            <a:off x="2417085" y="1946754"/>
+            <a:ext cx="3294678" cy="346760"/>
+            <a:chOff x="2404161" y="457200"/>
+            <a:chExt cx="3294678" cy="346760"/>
+          </a:xfrm>
+        </p:grpSpPr>
+        <p:sp>
+          <p:nvSpPr>
+            <p:cNvPr id="32" name="Rectangle 8"/>
+            <p:cNvSpPr/>
+            <p:nvPr/>
+          </p:nvSpPr>
+          <p:spPr>
+            <a:xfrm>
+              <a:off x="2861019" y="457200"/>
+              <a:ext cx="1323049" cy="346760"/>
+            </a:xfrm>
+            <a:prstGeom prst="rect">
+              <a:avLst/>
+            </a:prstGeom>
+            <a:solidFill>
+              <a:schemeClr val="accent6">
+                <a:lumMod val="75000"/>
+              </a:schemeClr>
+            </a:solidFill>
+            <a:ln w="19050">
+              <a:solidFill>
+                <a:schemeClr val="accent6">
+                  <a:lumMod val="75000"/>
+                </a:schemeClr>
+              </a:solidFill>
+            </a:ln>
+            <a:effectLst/>
+          </p:spPr>
+          <p:style>
+            <a:lnRef idx="1">
+              <a:schemeClr val="accent2"/>
+            </a:lnRef>
+            <a:fillRef idx="2">
+              <a:schemeClr val="accent2"/>
+            </a:fillRef>
+            <a:effectRef idx="1">
+              <a:schemeClr val="accent2"/>
+            </a:effectRef>
+            <a:fontRef idx="minor">
+              <a:schemeClr val="dk1"/>
+            </a:fontRef>
+          </p:style>
+          <p:txBody>
+            <a:bodyPr rtlCol="0" anchor="ctr"/>
+            <a:lstStyle/>
+            <a:p>
+              <a:pPr algn="ctr"/>
+              <a:r>
+                <a:rPr lang="en-US" sz="1050" dirty="0" smtClean="0">
+                  <a:solidFill>
+                    <a:schemeClr val="bg1"/>
+                  </a:solidFill>
+                </a:rPr>
+                <a:t>&lt;&lt;interface&gt;&gt;</a:t>
+              </a:r>
+              <a:br>
+                <a:rPr lang="en-US" sz="1050" dirty="0" smtClean="0">
+                  <a:solidFill>
+                    <a:schemeClr val="bg1"/>
+                  </a:solidFill>
+                </a:rPr>
+              </a:br>
+              <a:r>
+                <a:rPr lang="en-US" sz="1050" dirty="0" err="1">
+                  <a:solidFill>
+                    <a:schemeClr val="bg1"/>
+                  </a:solidFill>
+                </a:rPr>
+                <a:t>UserCredsStorage</a:t>
+              </a:r>
+              <a:endParaRPr lang="en-SG" sz="1050" dirty="0">
+                <a:solidFill>
+                  <a:schemeClr val="bg1"/>
+                </a:solidFill>
+              </a:endParaRPr>
+            </a:p>
+          </p:txBody>
+        </p:sp>
+        <p:cxnSp>
+          <p:nvCxnSpPr>
+            <p:cNvPr id="33" name="Straight Arrow Connector 32"/>
+            <p:cNvCxnSpPr/>
+            <p:nvPr/>
+          </p:nvCxnSpPr>
+          <p:spPr>
+            <a:xfrm>
+              <a:off x="2640209" y="625296"/>
+              <a:ext cx="220810" cy="5284"/>
+            </a:xfrm>
+            <a:prstGeom prst="straightConnector1">
+              <a:avLst/>
+            </a:prstGeom>
+            <a:ln w="19050">
+              <a:solidFill>
+                <a:schemeClr val="accent6">
+                  <a:lumMod val="75000"/>
+                </a:schemeClr>
+              </a:solidFill>
+              <a:headEnd type="none" w="med" len="med"/>
+              <a:tailEnd type="arrow" w="med" len="med"/>
+            </a:ln>
+            <a:effectLst/>
+          </p:spPr>
+          <p:style>
+            <a:lnRef idx="1">
+              <a:schemeClr val="accent2"/>
+            </a:lnRef>
+            <a:fillRef idx="2">
+              <a:schemeClr val="accent2"/>
+            </a:fillRef>
+            <a:effectRef idx="1">
+              <a:schemeClr val="accent2"/>
+            </a:effectRef>
+            <a:fontRef idx="minor">
+              <a:schemeClr val="dk1"/>
+            </a:fontRef>
+          </p:style>
+        </p:cxnSp>
+        <p:sp>
+          <p:nvSpPr>
+            <p:cNvPr id="34" name="Flowchart: Decision 96"/>
+            <p:cNvSpPr/>
+            <p:nvPr/>
+          </p:nvSpPr>
+          <p:spPr>
+            <a:xfrm>
+              <a:off x="2404161" y="538606"/>
+              <a:ext cx="236048" cy="173380"/>
+            </a:xfrm>
+            <a:prstGeom prst="flowChartDecision">
+              <a:avLst/>
+            </a:prstGeom>
+            <a:noFill/>
+            <a:ln w="19050">
+              <a:solidFill>
+                <a:schemeClr val="accent6">
+                  <a:lumMod val="75000"/>
+                </a:schemeClr>
+              </a:solidFill>
+            </a:ln>
+            <a:effectLst/>
+          </p:spPr>
+          <p:style>
+            <a:lnRef idx="1">
+              <a:schemeClr val="accent2"/>
+            </a:lnRef>
+            <a:fillRef idx="2">
+              <a:schemeClr val="accent2"/>
+            </a:fillRef>
+            <a:effectRef idx="1">
+              <a:schemeClr val="accent2"/>
+            </a:effectRef>
+            <a:fontRef idx="minor">
+              <a:schemeClr val="dk1"/>
+            </a:fontRef>
+          </p:style>
+          <p:txBody>
+            <a:bodyPr rtlCol="0" anchor="ctr"/>
+            <a:lstStyle/>
+            <a:p>
+              <a:pPr algn="ctr"/>
+              <a:endParaRPr lang="en-US" sz="1050">
+                <a:solidFill>
+                  <a:schemeClr val="bg1"/>
+                </a:solidFill>
+              </a:endParaRPr>
+            </a:p>
+          </p:txBody>
+        </p:sp>
+        <p:cxnSp>
+          <p:nvCxnSpPr>
+            <p:cNvPr id="35" name="Elbow Connector 63"/>
+            <p:cNvCxnSpPr/>
+            <p:nvPr/>
+          </p:nvCxnSpPr>
+          <p:spPr>
+            <a:xfrm flipV="1">
+              <a:off x="4381880" y="630580"/>
+              <a:ext cx="223324" cy="1"/>
+            </a:xfrm>
+            <a:prstGeom prst="bentConnector3">
+              <a:avLst>
+                <a:gd name="adj1" fmla="val 50000"/>
+              </a:avLst>
+            </a:prstGeom>
+            <a:ln w="19050">
+              <a:solidFill>
+                <a:schemeClr val="accent6">
+                  <a:lumMod val="75000"/>
+                </a:schemeClr>
+              </a:solidFill>
+              <a:prstDash val="sysDot"/>
+              <a:headEnd type="none" w="med" len="med"/>
+              <a:tailEnd type="none" w="med" len="med"/>
+            </a:ln>
+            <a:effectLst/>
+          </p:spPr>
+          <p:style>
+            <a:lnRef idx="1">
+              <a:schemeClr val="accent2"/>
+            </a:lnRef>
+            <a:fillRef idx="2">
+              <a:schemeClr val="accent2"/>
+            </a:fillRef>
+            <a:effectRef idx="1">
+              <a:schemeClr val="accent2"/>
+            </a:effectRef>
+            <a:fontRef idx="minor">
+              <a:schemeClr val="dk1"/>
+            </a:fontRef>
+          </p:style>
+        </p:cxnSp>
+        <p:sp>
+          <p:nvSpPr>
+            <p:cNvPr id="36" name="Isosceles Triangle 102"/>
+            <p:cNvSpPr/>
+            <p:nvPr/>
+          </p:nvSpPr>
+          <p:spPr>
+            <a:xfrm rot="5400000" flipV="1">
+              <a:off x="4158866" y="542819"/>
+              <a:ext cx="270504" cy="175523"/>
+            </a:xfrm>
+            <a:prstGeom prst="triangle">
+              <a:avLst/>
+            </a:prstGeom>
+            <a:solidFill>
+              <a:schemeClr val="accent6">
+                <a:lumMod val="75000"/>
+              </a:schemeClr>
+            </a:solidFill>
+            <a:ln w="19050">
+              <a:solidFill>
+                <a:schemeClr val="accent6">
+                  <a:lumMod val="75000"/>
+                </a:schemeClr>
+              </a:solidFill>
+            </a:ln>
+            <a:effectLst/>
+          </p:spPr>
+          <p:style>
+            <a:lnRef idx="1">
+              <a:schemeClr val="accent2"/>
+            </a:lnRef>
+            <a:fillRef idx="2">
+              <a:schemeClr val="accent2"/>
+            </a:fillRef>
+            <a:effectRef idx="1">
+              <a:schemeClr val="accent2"/>
+            </a:effectRef>
+            <a:fontRef idx="minor">
+              <a:schemeClr val="dk1"/>
+            </a:fontRef>
+          </p:style>
+          <p:txBody>
+            <a:bodyPr rtlCol="0" anchor="ctr"/>
+            <a:lstStyle/>
+            <a:p>
+              <a:pPr algn="ctr"/>
+              <a:endParaRPr lang="en-SG" sz="1050">
+                <a:solidFill>
+                  <a:schemeClr val="bg1"/>
+                </a:solidFill>
+              </a:endParaRPr>
+            </a:p>
+          </p:txBody>
+        </p:sp>
+        <p:sp>
+          <p:nvSpPr>
+            <p:cNvPr id="37" name="Rectangle 8"/>
+            <p:cNvSpPr/>
+            <p:nvPr/>
+          </p:nvSpPr>
+          <p:spPr>
+            <a:xfrm>
+              <a:off x="4605204" y="457200"/>
+              <a:ext cx="1093635" cy="346760"/>
+            </a:xfrm>
+            <a:prstGeom prst="rect">
+              <a:avLst/>
+            </a:prstGeom>
+            <a:solidFill>
+              <a:schemeClr val="accent6">
+                <a:lumMod val="75000"/>
+              </a:schemeClr>
+            </a:solidFill>
+            <a:ln w="19050">
+              <a:solidFill>
+                <a:schemeClr val="accent6">
+                  <a:lumMod val="75000"/>
+                </a:schemeClr>
+              </a:solidFill>
+            </a:ln>
+            <a:effectLst/>
+          </p:spPr>
+          <p:style>
+            <a:lnRef idx="1">
+              <a:schemeClr val="accent2"/>
+            </a:lnRef>
+            <a:fillRef idx="2">
+              <a:schemeClr val="accent2"/>
+            </a:fillRef>
+            <a:effectRef idx="1">
+              <a:schemeClr val="accent2"/>
+            </a:effectRef>
+            <a:fontRef idx="minor">
+              <a:schemeClr val="dk1"/>
+            </a:fontRef>
+          </p:style>
+          <p:txBody>
+            <a:bodyPr rtlCol="0" anchor="ctr"/>
+            <a:lstStyle/>
+            <a:p>
+              <a:pPr algn="ctr"/>
+              <a:r>
+                <a:rPr lang="en-US" sz="1050" dirty="0" err="1">
+                  <a:solidFill>
+                    <a:schemeClr val="bg1"/>
+                  </a:solidFill>
+                </a:rPr>
+                <a:t>JsonUserCreds</a:t>
+              </a:r>
+              <a:r>
+                <a:rPr lang="en-US" sz="1050" dirty="0" smtClean="0">
+                  <a:solidFill>
+                    <a:schemeClr val="bg1"/>
+                  </a:solidFill>
+                </a:rPr>
+                <a:t/>
+              </a:r>
+              <a:br>
+                <a:rPr lang="en-US" sz="1050" dirty="0" smtClean="0">
+                  <a:solidFill>
+                    <a:schemeClr val="bg1"/>
+                  </a:solidFill>
+                </a:rPr>
+              </a:br>
+              <a:r>
+                <a:rPr lang="en-US" sz="1050" dirty="0" smtClean="0">
+                  <a:solidFill>
+                    <a:schemeClr val="bg1"/>
+                  </a:solidFill>
+                </a:rPr>
+                <a:t>Storage</a:t>
+              </a:r>
+              <a:endParaRPr lang="en-SG" sz="1050" dirty="0">
+                <a:solidFill>
+                  <a:schemeClr val="bg1"/>
+                </a:solidFill>
+              </a:endParaRPr>
+            </a:p>
+          </p:txBody>
+        </p:sp>
+      </p:grpSp>
     </p:spTree>
     <p:extLst>
       <p:ext uri="{BB962C8B-B14F-4D97-AF65-F5344CB8AC3E}">

</xml_diff>